<commit_message>
Finalizing rvrefs and smartptrs slides
git-svn-id: https://svn.code.sf.net/p/cpp-lects-rus/code/trunk@229 39143b06-f351-456c-9f92-4cd32fad6823
</commit_message>
<xml_diff>
--- a/slides/sep2017/04-rvrefs.pptx
+++ b/slides/sep2017/04-rvrefs.pptx
@@ -271,7 +271,7 @@
           <a:p>
             <a:fld id="{42B673CC-54DE-46EA-9BF6-4F7267DE7790}" type="datetimeFigureOut">
               <a:rPr lang="en-US" smtClean="0"/>
-              <a:t>10/10/2017</a:t>
+              <a:t>10/13/2017</a:t>
             </a:fld>
             <a:endParaRPr lang="en-US"/>
           </a:p>
@@ -1071,7 +1071,7 @@
           <a:p>
             <a:fld id="{75F9419B-997A-4DB3-B455-BA5B759E50E2}" type="datetime1">
               <a:rPr lang="en-US" smtClean="0"/>
-              <a:t>10/10/2017</a:t>
+              <a:t>10/13/2017</a:t>
             </a:fld>
             <a:endParaRPr lang="en-US" dirty="0"/>
           </a:p>
@@ -1288,7 +1288,7 @@
           <a:p>
             <a:fld id="{C6CC5998-8A6A-47C5-9B68-7DBDD02CD12B}" type="datetime1">
               <a:rPr lang="en-US" smtClean="0"/>
-              <a:t>10/10/2017</a:t>
+              <a:t>10/13/2017</a:t>
             </a:fld>
             <a:endParaRPr lang="en-US" dirty="0"/>
           </a:p>
@@ -1463,7 +1463,7 @@
           <a:p>
             <a:fld id="{62E8AF54-3DCA-4889-889B-9A1B7DADA6F3}" type="datetime1">
               <a:rPr lang="en-US" smtClean="0"/>
-              <a:t>10/10/2017</a:t>
+              <a:t>10/13/2017</a:t>
             </a:fld>
             <a:endParaRPr lang="en-US" dirty="0"/>
           </a:p>
@@ -1628,7 +1628,7 @@
           <a:p>
             <a:fld id="{23B30E8C-73F3-44B6-B292-9149781C3E45}" type="datetime1">
               <a:rPr lang="en-US" smtClean="0"/>
-              <a:t>10/10/2017</a:t>
+              <a:t>10/13/2017</a:t>
             </a:fld>
             <a:endParaRPr lang="en-US" dirty="0"/>
           </a:p>
@@ -1874,7 +1874,7 @@
           <a:p>
             <a:fld id="{8F98511A-D7A1-495A-AB75-DB217D4D1BE6}" type="datetime1">
               <a:rPr lang="en-US" smtClean="0"/>
-              <a:t>10/10/2017</a:t>
+              <a:t>10/13/2017</a:t>
             </a:fld>
             <a:endParaRPr lang="en-US" dirty="0"/>
           </a:p>
@@ -2192,7 +2192,7 @@
           <a:p>
             <a:fld id="{5A3D96A9-DE7D-436E-A318-A4E69F80CDDE}" type="datetime1">
               <a:rPr lang="en-US" smtClean="0"/>
-              <a:t>10/10/2017</a:t>
+              <a:t>10/13/2017</a:t>
             </a:fld>
             <a:endParaRPr lang="en-US" dirty="0"/>
           </a:p>
@@ -2611,7 +2611,7 @@
           <a:p>
             <a:fld id="{C8C4F50B-8F30-4843-88BA-E70C6803AE81}" type="datetime1">
               <a:rPr lang="en-US" smtClean="0"/>
-              <a:t>10/10/2017</a:t>
+              <a:t>10/13/2017</a:t>
             </a:fld>
             <a:endParaRPr lang="en-US" dirty="0"/>
           </a:p>
@@ -2724,7 +2724,7 @@
           <a:p>
             <a:fld id="{D798BDAB-1A29-434F-980D-BEA612B3AFBD}" type="datetime1">
               <a:rPr lang="en-US" smtClean="0"/>
-              <a:t>10/10/2017</a:t>
+              <a:t>10/13/2017</a:t>
             </a:fld>
             <a:endParaRPr lang="en-US" dirty="0"/>
           </a:p>
@@ -2814,7 +2814,7 @@
           <a:p>
             <a:fld id="{E7C202B4-4E30-434E-A44E-E63B6767896D}" type="datetime1">
               <a:rPr lang="en-US" smtClean="0"/>
-              <a:t>10/10/2017</a:t>
+              <a:t>10/13/2017</a:t>
             </a:fld>
             <a:endParaRPr lang="en-US" dirty="0"/>
           </a:p>
@@ -3099,7 +3099,7 @@
           <a:p>
             <a:fld id="{E080761B-5701-430A-B2BB-43AA25E22D75}" type="datetime1">
               <a:rPr lang="en-US" smtClean="0"/>
-              <a:t>10/10/2017</a:t>
+              <a:t>10/13/2017</a:t>
             </a:fld>
             <a:endParaRPr lang="en-US" dirty="0"/>
           </a:p>
@@ -3366,7 +3366,7 @@
           <a:p>
             <a:fld id="{337559B5-BE9F-4B2F-BDAB-41ED7288D38B}" type="datetime1">
               <a:rPr lang="en-US" smtClean="0"/>
-              <a:t>10/10/2017</a:t>
+              <a:t>10/13/2017</a:t>
             </a:fld>
             <a:endParaRPr lang="en-US" dirty="0"/>
           </a:p>
@@ -3614,7 +3614,7 @@
           <a:p>
             <a:fld id="{9BB245C0-A2FD-4F36-99B0-F1C21E77F34C}" type="datetime1">
               <a:rPr lang="en-US" smtClean="0"/>
-              <a:t>10/10/2017</a:t>
+              <a:t>10/13/2017</a:t>
             </a:fld>
             <a:endParaRPr lang="en-US" dirty="0"/>
           </a:p>
@@ -17990,6 +17990,13 @@
   <p:clrMapOvr>
     <a:masterClrMapping/>
   </p:clrMapOvr>
+  <p:timing>
+    <p:tnLst>
+      <p:par>
+        <p:cTn id="1" dur="indefinite" restart="never" nodeType="tmRoot"/>
+      </p:par>
+    </p:tnLst>
+  </p:timing>
 </p:sld>
 </file>
 
@@ -18359,6 +18366,13 @@
   <p:clrMapOvr>
     <a:masterClrMapping/>
   </p:clrMapOvr>
+  <p:timing>
+    <p:tnLst>
+      <p:par>
+        <p:cTn id="1" dur="indefinite" restart="never" nodeType="tmRoot"/>
+      </p:par>
+    </p:tnLst>
+  </p:timing>
 </p:sld>
 </file>
 
@@ -18649,6 +18663,13 @@
   <p:clrMapOvr>
     <a:masterClrMapping/>
   </p:clrMapOvr>
+  <p:timing>
+    <p:tnLst>
+      <p:par>
+        <p:cTn id="1" dur="indefinite" restart="never" nodeType="tmRoot"/>
+      </p:par>
+    </p:tnLst>
+  </p:timing>
 </p:sld>
 </file>
 
@@ -19536,15 +19557,7 @@
           <a:p>
             <a:r>
               <a:rPr lang="ru-RU" smtClean="0"/>
-              <a:t>Простые </a:t>
-            </a:r>
-            <a:r>
-              <a:rPr lang="ru-RU" smtClean="0"/>
-              <a:t>случаи довольно ясны, но что происходит в сложных случаях</a:t>
-            </a:r>
-            <a:r>
-              <a:rPr lang="ru-RU" smtClean="0"/>
-              <a:t>?</a:t>
+              <a:t>Простые случаи довольно ясны, но что происходит в сложных случаях?</a:t>
             </a:r>
           </a:p>
           <a:p>
@@ -19555,13 +19568,7 @@
               <a:rPr lang="en-US">
                 <a:latin typeface="Consolas" panose="020B0609020204030204" pitchFamily="49" charset="0"/>
               </a:rPr>
-              <a:t>const </a:t>
-            </a:r>
-            <a:r>
-              <a:rPr lang="en-US">
-                <a:latin typeface="Consolas" panose="020B0609020204030204" pitchFamily="49" charset="0"/>
-              </a:rPr>
-              <a:t>int </a:t>
+              <a:t>const int </a:t>
             </a:r>
             <a:r>
               <a:rPr lang="en-US" smtClean="0">
@@ -19593,13 +19600,7 @@
               <a:rPr lang="en-US">
                 <a:latin typeface="Consolas" panose="020B0609020204030204" pitchFamily="49" charset="0"/>
               </a:rPr>
-              <a:t>h(x); </a:t>
-            </a:r>
-            <a:r>
-              <a:rPr lang="en-US">
-                <a:latin typeface="Consolas" panose="020B0609020204030204" pitchFamily="49" charset="0"/>
-              </a:rPr>
-              <a:t>// </a:t>
+              <a:t>h(x); // </a:t>
             </a:r>
             <a:r>
               <a:rPr lang="en-US" smtClean="0">
@@ -19652,6 +19653,13 @@
   <p:clrMapOvr>
     <a:masterClrMapping/>
   </p:clrMapOvr>
+  <p:timing>
+    <p:tnLst>
+      <p:par>
+        <p:cTn id="1" dur="indefinite" restart="never" nodeType="tmRoot"/>
+      </p:par>
+    </p:tnLst>
+  </p:timing>
 </p:sld>
 </file>
 
@@ -19859,13 +19867,7 @@
               <a:rPr lang="en-US" smtClean="0">
                 <a:latin typeface="Consolas" panose="020B0609020204030204" pitchFamily="49" charset="0"/>
               </a:rPr>
-              <a:t>const int </a:t>
-            </a:r>
-            <a:r>
-              <a:rPr lang="en-US" smtClean="0">
-                <a:latin typeface="Consolas" panose="020B0609020204030204" pitchFamily="49" charset="0"/>
-              </a:rPr>
-              <a:t>x</a:t>
+              <a:t>const int x</a:t>
             </a:r>
             <a:r>
               <a:rPr lang="ru-RU" smtClean="0">
@@ -19879,9 +19881,6 @@
               </a:rPr>
               <a:t>;</a:t>
             </a:r>
-            <a:endParaRPr lang="en-US" smtClean="0">
-              <a:latin typeface="Consolas" panose="020B0609020204030204" pitchFamily="49" charset="0"/>
-            </a:endParaRPr>
           </a:p>
           <a:p>
             <a:pPr marL="45720" indent="0">
@@ -19961,6 +19960,13 @@
   <p:clrMapOvr>
     <a:masterClrMapping/>
   </p:clrMapOvr>
+  <p:timing>
+    <p:tnLst>
+      <p:par>
+        <p:cTn id="1" dur="indefinite" restart="never" nodeType="tmRoot"/>
+      </p:par>
+    </p:tnLst>
+  </p:timing>
 </p:sld>
 </file>
 
@@ -20234,6 +20240,13 @@
   <p:clrMapOvr>
     <a:masterClrMapping/>
   </p:clrMapOvr>
+  <p:timing>
+    <p:tnLst>
+      <p:par>
+        <p:cTn id="1" dur="indefinite" restart="never" nodeType="tmRoot"/>
+      </p:par>
+    </p:tnLst>
+  </p:timing>
 </p:sld>
 </file>
 
@@ -20335,13 +20348,7 @@
               <a:rPr lang="en-US" smtClean="0">
                 <a:latin typeface="Consolas" panose="020B0609020204030204" pitchFamily="49" charset="0"/>
               </a:rPr>
-              <a:t>  </a:t>
-            </a:r>
-            <a:r>
-              <a:rPr lang="en-US" smtClean="0">
-                <a:latin typeface="Consolas" panose="020B0609020204030204" pitchFamily="49" charset="0"/>
-              </a:rPr>
-              <a:t>using rv_ref_t = remove_reference_t&lt;T</a:t>
+              <a:t>  using rv_ref_t = remove_reference_t&lt;T</a:t>
             </a:r>
             <a:r>
               <a:rPr lang="en-US">
@@ -20349,12 +20356,6 @@
               </a:rPr>
               <a:t>&gt;&amp;&amp;;</a:t>
             </a:r>
-            <a:r>
-              <a:rPr lang="en-US">
-                <a:latin typeface="Consolas" panose="020B0609020204030204" pitchFamily="49" charset="0"/>
-              </a:rPr>
-              <a:t/>
-            </a:r>
             <a:br>
               <a:rPr lang="en-US">
                 <a:latin typeface="Consolas" panose="020B0609020204030204" pitchFamily="49" charset="0"/>
@@ -20364,19 +20365,7 @@
               <a:rPr lang="en-US" smtClean="0">
                 <a:latin typeface="Consolas" panose="020B0609020204030204" pitchFamily="49" charset="0"/>
               </a:rPr>
-              <a:t>  return </a:t>
-            </a:r>
-            <a:r>
-              <a:rPr lang="en-US" smtClean="0">
-                <a:latin typeface="Consolas" panose="020B0609020204030204" pitchFamily="49" charset="0"/>
-              </a:rPr>
-              <a:t>static_cast</a:t>
-            </a:r>
-            <a:r>
-              <a:rPr lang="en-US" smtClean="0">
-                <a:latin typeface="Consolas" panose="020B0609020204030204" pitchFamily="49" charset="0"/>
-              </a:rPr>
-              <a:t>&lt;rv_ref_t&gt;(</a:t>
+              <a:t>  return static_cast&lt;rv_ref_t&gt;(</a:t>
             </a:r>
             <a:r>
               <a:rPr lang="en-US">
@@ -20422,7 +20411,6 @@
               <a:rPr lang="ru-RU" smtClean="0"/>
               <a:t>Второе: здесь есть контекст вывода типа и универсальная ссылка</a:t>
             </a:r>
-            <a:endParaRPr lang="ru-RU" smtClean="0"/>
           </a:p>
         </p:txBody>
       </p:sp>
@@ -20459,6 +20447,13 @@
   <p:clrMapOvr>
     <a:masterClrMapping/>
   </p:clrMapOvr>
+  <p:timing>
+    <p:tnLst>
+      <p:par>
+        <p:cTn id="1" dur="indefinite" restart="never" nodeType="tmRoot"/>
+      </p:par>
+    </p:tnLst>
+  </p:timing>
 </p:sld>
 </file>
 
@@ -20549,13 +20544,7 @@
               <a:rPr lang="en-US" smtClean="0">
                 <a:latin typeface="Consolas" panose="020B0609020204030204" pitchFamily="49" charset="0"/>
               </a:rPr>
-              <a:t>almost_forward </a:t>
-            </a:r>
-            <a:r>
-              <a:rPr lang="en-US" smtClean="0">
-                <a:latin typeface="Consolas" panose="020B0609020204030204" pitchFamily="49" charset="0"/>
-              </a:rPr>
-              <a:t>(remove_reference_t&lt;S</a:t>
+              <a:t>almost_forward (remove_reference_t&lt;S</a:t>
             </a:r>
             <a:r>
               <a:rPr lang="en-US">
@@ -20603,9 +20592,6 @@
               </a:rPr>
               <a:t>}</a:t>
             </a:r>
-            <a:endParaRPr lang="en-US" smtClean="0">
-              <a:latin typeface="Consolas" panose="020B0609020204030204" pitchFamily="49" charset="0"/>
-            </a:endParaRPr>
           </a:p>
           <a:p>
             <a:r>
@@ -20649,15 +20635,7 @@
             </a:r>
             <a:r>
               <a:rPr lang="ru-RU" smtClean="0"/>
-              <a:t> контекста вывода.</a:t>
-            </a:r>
-            <a:r>
-              <a:rPr lang="ru-RU" smtClean="0"/>
-              <a:t> Поэтому необходимо </a:t>
-            </a:r>
-            <a:r>
-              <a:rPr lang="ru-RU" smtClean="0"/>
-              <a:t>использование управляющего типа </a:t>
+              <a:t> контекста вывода. Поэтому необходимо использование управляющего типа </a:t>
             </a:r>
             <a:r>
               <a:rPr lang="en-US" smtClean="0"/>
@@ -20665,11 +20643,7 @@
             </a:r>
             <a:r>
               <a:rPr lang="ru-RU" smtClean="0"/>
-              <a:t> который универсально сворачивается в нужный тип </a:t>
-            </a:r>
-            <a:r>
-              <a:rPr lang="ru-RU" smtClean="0"/>
-              <a:t>ссылки</a:t>
+              <a:t> который универсально сворачивается в нужный тип ссылки</a:t>
             </a:r>
             <a:endParaRPr lang="en-US"/>
           </a:p>
@@ -20708,6 +20682,13 @@
   <p:clrMapOvr>
     <a:masterClrMapping/>
   </p:clrMapOvr>
+  <p:timing>
+    <p:tnLst>
+      <p:par>
+        <p:cTn id="1" dur="indefinite" restart="never" nodeType="tmRoot"/>
+      </p:par>
+    </p:tnLst>
+  </p:timing>
 </p:sld>
 </file>
 
@@ -20909,23 +20890,8 @@
               <a:rPr lang="en-US" smtClean="0">
                 <a:latin typeface="Consolas" panose="020B0609020204030204" pitchFamily="49" charset="0"/>
               </a:rPr>
-              <a:t>const </a:t>
-            </a:r>
-            <a:r>
-              <a:rPr lang="en-US" smtClean="0">
-                <a:latin typeface="Consolas" panose="020B0609020204030204" pitchFamily="49" charset="0"/>
-              </a:rPr>
-              <a:t>int </a:t>
-            </a:r>
-            <a:r>
-              <a:rPr lang="en-US" smtClean="0">
-                <a:latin typeface="Consolas" panose="020B0609020204030204" pitchFamily="49" charset="0"/>
-              </a:rPr>
-              <a:t>x = 1;</a:t>
-            </a:r>
-            <a:endParaRPr lang="en-US" smtClean="0">
-              <a:latin typeface="Consolas" panose="020B0609020204030204" pitchFamily="49" charset="0"/>
-            </a:endParaRPr>
+              <a:t>const int x = 1;</a:t>
+            </a:r>
           </a:p>
           <a:p>
             <a:pPr marL="45720" indent="0">
@@ -21048,12 +21014,6 @@
                 <a:latin typeface="Consolas" panose="020B0609020204030204" pitchFamily="49" charset="0"/>
               </a:rPr>
               <a:t>&gt;(a);</a:t>
-            </a:r>
-            <a:r>
-              <a:rPr lang="en-US">
-                <a:latin typeface="Consolas" panose="020B0609020204030204" pitchFamily="49" charset="0"/>
-              </a:rPr>
-              <a:t/>
             </a:r>
             <a:br>
               <a:rPr lang="en-US">
@@ -21102,6 +21062,13 @@
   <p:clrMapOvr>
     <a:masterClrMapping/>
   </p:clrMapOvr>
+  <p:timing>
+    <p:tnLst>
+      <p:par>
+        <p:cTn id="1" dur="indefinite" restart="never" nodeType="tmRoot"/>
+      </p:par>
+    </p:tnLst>
+  </p:timing>
 </p:sld>
 </file>
 
@@ -21308,23 +21275,8 @@
               <a:rPr lang="en-US" smtClean="0">
                 <a:latin typeface="Consolas" panose="020B0609020204030204" pitchFamily="49" charset="0"/>
               </a:rPr>
-              <a:t>const </a:t>
-            </a:r>
-            <a:r>
-              <a:rPr lang="en-US" smtClean="0">
-                <a:latin typeface="Consolas" panose="020B0609020204030204" pitchFamily="49" charset="0"/>
-              </a:rPr>
-              <a:t>int </a:t>
-            </a:r>
-            <a:r>
-              <a:rPr lang="en-US" smtClean="0">
-                <a:latin typeface="Consolas" panose="020B0609020204030204" pitchFamily="49" charset="0"/>
-              </a:rPr>
-              <a:t>x = 1;</a:t>
-            </a:r>
-            <a:endParaRPr lang="en-US" smtClean="0">
-              <a:latin typeface="Consolas" panose="020B0609020204030204" pitchFamily="49" charset="0"/>
-            </a:endParaRPr>
+              <a:t>const int x = 1;</a:t>
+            </a:r>
           </a:p>
           <a:p>
             <a:pPr marL="45720" indent="0">
@@ -21428,13 +21380,7 @@
               <a:rPr lang="en-US">
                 <a:latin typeface="Consolas" panose="020B0609020204030204" pitchFamily="49" charset="0"/>
               </a:rPr>
-              <a:t>  </a:t>
-            </a:r>
-            <a:r>
-              <a:rPr lang="en-US">
-                <a:latin typeface="Consolas" panose="020B0609020204030204" pitchFamily="49" charset="0"/>
-              </a:rPr>
-              <a:t>return </a:t>
+              <a:t>  return </a:t>
             </a:r>
             <a:r>
               <a:rPr lang="en-US" smtClean="0">
@@ -21447,12 +21393,6 @@
                 <a:latin typeface="Consolas" panose="020B0609020204030204" pitchFamily="49" charset="0"/>
               </a:rPr>
               <a:t>a);</a:t>
-            </a:r>
-            <a:r>
-              <a:rPr lang="en-US">
-                <a:latin typeface="Consolas" panose="020B0609020204030204" pitchFamily="49" charset="0"/>
-              </a:rPr>
-              <a:t/>
             </a:r>
             <a:br>
               <a:rPr lang="en-US">
@@ -21501,6 +21441,13 @@
   <p:clrMapOvr>
     <a:masterClrMapping/>
   </p:clrMapOvr>
+  <p:timing>
+    <p:tnLst>
+      <p:par>
+        <p:cTn id="1" dur="indefinite" restart="never" nodeType="tmRoot"/>
+      </p:par>
+    </p:tnLst>
+  </p:timing>
 </p:sld>
 </file>
 
@@ -21707,23 +21654,8 @@
               <a:rPr lang="en-US" smtClean="0">
                 <a:latin typeface="Consolas" panose="020B0609020204030204" pitchFamily="49" charset="0"/>
               </a:rPr>
-              <a:t>const </a:t>
-            </a:r>
-            <a:r>
-              <a:rPr lang="en-US" smtClean="0">
-                <a:latin typeface="Consolas" panose="020B0609020204030204" pitchFamily="49" charset="0"/>
-              </a:rPr>
-              <a:t>int </a:t>
-            </a:r>
-            <a:r>
-              <a:rPr lang="en-US" smtClean="0">
-                <a:latin typeface="Consolas" panose="020B0609020204030204" pitchFamily="49" charset="0"/>
-              </a:rPr>
-              <a:t>x = 1;</a:t>
-            </a:r>
-            <a:endParaRPr lang="en-US" smtClean="0">
-              <a:latin typeface="Consolas" panose="020B0609020204030204" pitchFamily="49" charset="0"/>
-            </a:endParaRPr>
+              <a:t>const int x = 1;</a:t>
+            </a:r>
           </a:p>
           <a:p>
             <a:pPr marL="45720" indent="0">
@@ -21753,12 +21685,6 @@
               </a:rPr>
               <a:t>: g([const int&amp;])</a:t>
             </a:r>
-            <a:endParaRPr lang="en-US" smtClean="0">
-              <a:solidFill>
-                <a:srgbClr val="FF0000"/>
-              </a:solidFill>
-              <a:latin typeface="Consolas" panose="020B0609020204030204" pitchFamily="49" charset="0"/>
-            </a:endParaRPr>
           </a:p>
           <a:p>
             <a:r>
@@ -21845,13 +21771,7 @@
               <a:rPr lang="en-US">
                 <a:latin typeface="Consolas" panose="020B0609020204030204" pitchFamily="49" charset="0"/>
               </a:rPr>
-              <a:t>  </a:t>
-            </a:r>
-            <a:r>
-              <a:rPr lang="en-US">
-                <a:latin typeface="Consolas" panose="020B0609020204030204" pitchFamily="49" charset="0"/>
-              </a:rPr>
-              <a:t>return </a:t>
+              <a:t>  return </a:t>
             </a:r>
             <a:r>
               <a:rPr lang="en-US" smtClean="0">
@@ -21864,12 +21784,6 @@
                 <a:latin typeface="Consolas" panose="020B0609020204030204" pitchFamily="49" charset="0"/>
               </a:rPr>
               <a:t>a);</a:t>
-            </a:r>
-            <a:r>
-              <a:rPr lang="en-US">
-                <a:latin typeface="Consolas" panose="020B0609020204030204" pitchFamily="49" charset="0"/>
-              </a:rPr>
-              <a:t/>
             </a:r>
             <a:br>
               <a:rPr lang="en-US">
@@ -21918,6 +21832,13 @@
   <p:clrMapOvr>
     <a:masterClrMapping/>
   </p:clrMapOvr>
+  <p:timing>
+    <p:tnLst>
+      <p:par>
+        <p:cTn id="1" dur="indefinite" restart="never" nodeType="tmRoot"/>
+      </p:par>
+    </p:tnLst>
+  </p:timing>
 </p:sld>
 </file>
 
@@ -22156,13 +22077,7 @@
               <a:rPr lang="en-US" smtClean="0">
                 <a:latin typeface="Consolas" panose="020B0609020204030204" pitchFamily="49" charset="0"/>
               </a:rPr>
-              <a:t>h(x); </a:t>
-            </a:r>
-            <a:r>
-              <a:rPr lang="en-US" smtClean="0">
-                <a:latin typeface="Consolas" panose="020B0609020204030204" pitchFamily="49" charset="0"/>
-              </a:rPr>
-              <a:t>// </a:t>
+              <a:t>h(x); // </a:t>
             </a:r>
             <a:r>
               <a:rPr lang="en-US" smtClean="0">
@@ -22177,11 +22092,7 @@
           <a:p>
             <a:r>
               <a:rPr lang="ru-RU" smtClean="0"/>
-              <a:t>Ответ можно </a:t>
-            </a:r>
-            <a:r>
-              <a:rPr lang="ru-RU" smtClean="0"/>
-              <a:t>вычислить, вручную размотав работу </a:t>
+              <a:t>Ответ можно вычислить, вручную размотав работу </a:t>
             </a:r>
             <a:r>
               <a:rPr lang="en-US" smtClean="0"/>
@@ -22196,13 +22107,7 @@
               <a:rPr lang="en-US">
                 <a:latin typeface="Consolas" panose="020B0609020204030204" pitchFamily="49" charset="0"/>
               </a:rPr>
-              <a:t>template &lt;typename T&gt; decltype </a:t>
-            </a:r>
-            <a:r>
-              <a:rPr lang="en-US">
-                <a:latin typeface="Consolas" panose="020B0609020204030204" pitchFamily="49" charset="0"/>
-              </a:rPr>
-              <a:t>(</a:t>
+              <a:t>template &lt;typename T&gt; decltype (</a:t>
             </a:r>
             <a:r>
               <a:rPr lang="en-US" smtClean="0">
@@ -22285,6 +22190,13 @@
   <p:clrMapOvr>
     <a:masterClrMapping/>
   </p:clrMapOvr>
+  <p:timing>
+    <p:tnLst>
+      <p:par>
+        <p:cTn id="1" dur="indefinite" restart="never" nodeType="tmRoot"/>
+      </p:par>
+    </p:tnLst>
+  </p:timing>
 </p:sld>
 </file>
 
@@ -22523,13 +22435,13 @@
               <a:rPr lang="en-US" smtClean="0">
                 <a:latin typeface="Consolas" panose="020B0609020204030204" pitchFamily="49" charset="0"/>
               </a:rPr>
-              <a:t>h(x); </a:t>
-            </a:r>
-            <a:r>
-              <a:rPr lang="en-US" smtClean="0">
-                <a:latin typeface="Consolas" panose="020B0609020204030204" pitchFamily="49" charset="0"/>
-              </a:rPr>
-              <a:t>// </a:t>
+              <a:t>h(x); // </a:t>
+            </a:r>
+            <a:r>
+              <a:rPr lang="ru-RU" smtClean="0">
+                <a:latin typeface="Consolas" panose="020B0609020204030204" pitchFamily="49" charset="0"/>
+              </a:rPr>
+              <a:t>печатает </a:t>
             </a:r>
             <a:r>
               <a:rPr lang="ru-RU" smtClean="0">
@@ -22538,7 +22450,7 @@
                 </a:solidFill>
                 <a:latin typeface="Consolas" panose="020B0609020204030204" pitchFamily="49" charset="0"/>
               </a:rPr>
-              <a:t>как ни странно, ответ "</a:t>
+              <a:t>"</a:t>
             </a:r>
             <a:r>
               <a:rPr lang="en-US" smtClean="0">
@@ -22568,11 +22480,7 @@
           <a:p>
             <a:r>
               <a:rPr lang="ru-RU" smtClean="0"/>
-              <a:t>Ответ можно </a:t>
-            </a:r>
-            <a:r>
-              <a:rPr lang="ru-RU" smtClean="0"/>
-              <a:t>вычислить, вручную размотав работу </a:t>
+              <a:t>Ответ можно вычислить, вручную размотав работу </a:t>
             </a:r>
             <a:r>
               <a:rPr lang="en-US" smtClean="0"/>
@@ -22584,28 +22492,16 @@
               <a:buNone/>
             </a:pPr>
             <a:r>
-              <a:rPr lang="en-US">
-                <a:latin typeface="Consolas" panose="020B0609020204030204" pitchFamily="49" charset="0"/>
-              </a:rPr>
-              <a:t>template &lt;typename T&gt; decltype </a:t>
-            </a:r>
-            <a:r>
-              <a:rPr lang="en-US">
-                <a:latin typeface="Consolas" panose="020B0609020204030204" pitchFamily="49" charset="0"/>
-              </a:rPr>
-              <a:t>(</a:t>
-            </a:r>
-            <a:r>
-              <a:rPr lang="en-US" smtClean="0">
-                <a:latin typeface="Consolas" panose="020B0609020204030204" pitchFamily="49" charset="0"/>
-              </a:rPr>
-              <a:t>auto) almost_move(T</a:t>
-            </a:r>
-            <a:r>
-              <a:rPr lang="en-US">
-                <a:latin typeface="Consolas" panose="020B0609020204030204" pitchFamily="49" charset="0"/>
-              </a:rPr>
-              <a:t>&amp;&amp; a) {</a:t>
+              <a:rPr lang="en-US" smtClean="0">
+                <a:latin typeface="Consolas" panose="020B0609020204030204" pitchFamily="49" charset="0"/>
+              </a:rPr>
+              <a:t>int&amp;&amp; almost_move&lt;int&amp;&gt;(int&amp; </a:t>
+            </a:r>
+            <a:r>
+              <a:rPr lang="en-US">
+                <a:latin typeface="Consolas" panose="020B0609020204030204" pitchFamily="49" charset="0"/>
+              </a:rPr>
+              <a:t>a) {</a:t>
             </a:r>
             <a:br>
               <a:rPr lang="en-US">
@@ -22616,7 +22512,19 @@
               <a:rPr lang="en-US">
                 <a:latin typeface="Consolas" panose="020B0609020204030204" pitchFamily="49" charset="0"/>
               </a:rPr>
-              <a:t>  using rv_ref_t = remove_reference_t&lt;T&gt;&amp;&amp;;</a:t>
+              <a:t>  using rv_ref_t = </a:t>
+            </a:r>
+            <a:r>
+              <a:rPr lang="en-US" smtClean="0">
+                <a:latin typeface="Consolas" panose="020B0609020204030204" pitchFamily="49" charset="0"/>
+              </a:rPr>
+              <a:t>int&amp;&amp;;</a:t>
+            </a:r>
+            <a:r>
+              <a:rPr lang="en-US">
+                <a:latin typeface="Consolas" panose="020B0609020204030204" pitchFamily="49" charset="0"/>
+              </a:rPr>
+              <a:t/>
             </a:r>
             <a:br>
               <a:rPr lang="en-US">
@@ -22627,7 +22535,19 @@
               <a:rPr lang="en-US">
                 <a:latin typeface="Consolas" panose="020B0609020204030204" pitchFamily="49" charset="0"/>
               </a:rPr>
-              <a:t>  return static_cast&lt;rv_ref_t&gt;(a);</a:t>
+              <a:t>  return </a:t>
+            </a:r>
+            <a:r>
+              <a:rPr lang="en-US" smtClean="0">
+                <a:latin typeface="Consolas" panose="020B0609020204030204" pitchFamily="49" charset="0"/>
+              </a:rPr>
+              <a:t>static_cast&lt;rv_ref_t&gt;(</a:t>
+            </a:r>
+            <a:r>
+              <a:rPr lang="en-US">
+                <a:latin typeface="Consolas" panose="020B0609020204030204" pitchFamily="49" charset="0"/>
+              </a:rPr>
+              <a:t>a);</a:t>
             </a:r>
             <a:br>
               <a:rPr lang="en-US">
@@ -22676,6 +22596,13 @@
   <p:clrMapOvr>
     <a:masterClrMapping/>
   </p:clrMapOvr>
+  <p:timing>
+    <p:tnLst>
+      <p:par>
+        <p:cTn id="1" dur="indefinite" restart="never" nodeType="tmRoot"/>
+      </p:par>
+    </p:tnLst>
+  </p:timing>
 </p:sld>
 </file>
 
@@ -23395,6 +23322,13 @@
   <p:clrMapOvr>
     <a:masterClrMapping/>
   </p:clrMapOvr>
+  <p:timing>
+    <p:tnLst>
+      <p:par>
+        <p:cTn id="1" dur="indefinite" restart="never" nodeType="tmRoot"/>
+      </p:par>
+    </p:tnLst>
+  </p:timing>
 </p:sld>
 </file>
 
@@ -23621,6 +23555,13 @@
   <p:clrMapOvr>
     <a:masterClrMapping/>
   </p:clrMapOvr>
+  <p:timing>
+    <p:tnLst>
+      <p:par>
+        <p:cTn id="1" dur="indefinite" restart="never" nodeType="tmRoot"/>
+      </p:par>
+    </p:tnLst>
+  </p:timing>
 </p:sld>
 </file>
 
@@ -23821,6 +23762,13 @@
   <p:clrMapOvr>
     <a:masterClrMapping/>
   </p:clrMapOvr>
+  <p:timing>
+    <p:tnLst>
+      <p:par>
+        <p:cTn id="1" dur="indefinite" restart="never" nodeType="tmRoot"/>
+      </p:par>
+    </p:tnLst>
+  </p:timing>
 </p:sld>
 </file>
 
@@ -24049,6 +23997,13 @@
   <p:clrMapOvr>
     <a:masterClrMapping/>
   </p:clrMapOvr>
+  <p:timing>
+    <p:tnLst>
+      <p:par>
+        <p:cTn id="1" dur="indefinite" restart="never" nodeType="tmRoot"/>
+      </p:par>
+    </p:tnLst>
+  </p:timing>
 </p:sld>
 </file>
 
@@ -24875,6 +24830,13 @@
   <p:clrMapOvr>
     <a:masterClrMapping/>
   </p:clrMapOvr>
+  <p:timing>
+    <p:tnLst>
+      <p:par>
+        <p:cTn id="1" dur="indefinite" restart="never" nodeType="tmRoot"/>
+      </p:par>
+    </p:tnLst>
+  </p:timing>
 </p:sld>
 </file>
 
@@ -24954,11 +24916,7 @@
             </a:r>
             <a:r>
               <a:rPr lang="ru-RU" smtClean="0"/>
-              <a:t>это значение, возвращённое из функции по правой </a:t>
-            </a:r>
-            <a:r>
-              <a:rPr lang="ru-RU" smtClean="0"/>
-              <a:t>ссылке</a:t>
+              <a:t>это значение, возвращённое из функции по правой ссылке</a:t>
             </a:r>
             <a:r>
               <a:rPr lang="en-US" smtClean="0"/>
@@ -24987,7 +24945,6 @@
               <a:rPr lang="ru-RU" smtClean="0"/>
               <a:t>Функторы-определители</a:t>
             </a:r>
-            <a:endParaRPr lang="ru-RU" smtClean="0"/>
           </a:p>
           <a:p>
             <a:pPr lvl="1"/>
@@ -25169,6 +25126,13 @@
   <p:clrMapOvr>
     <a:masterClrMapping/>
   </p:clrMapOvr>
+  <p:timing>
+    <p:tnLst>
+      <p:par>
+        <p:cTn id="1" dur="indefinite" restart="never" nodeType="tmRoot"/>
+      </p:par>
+    </p:tnLst>
+  </p:timing>
 </p:sld>
 </file>
 
@@ -25248,11 +25212,7 @@
             </a:r>
             <a:r>
               <a:rPr lang="ru-RU" smtClean="0"/>
-              <a:t>это значение, возвращённое из функции по правой </a:t>
-            </a:r>
-            <a:r>
-              <a:rPr lang="ru-RU" smtClean="0"/>
-              <a:t>ссылке</a:t>
+              <a:t>это значение, возвращённое из функции по правой ссылке</a:t>
             </a:r>
             <a:r>
               <a:rPr lang="en-US" smtClean="0"/>
@@ -25281,7 +25241,6 @@
               <a:rPr lang="ru-RU" smtClean="0"/>
               <a:t>Функторы-определители</a:t>
             </a:r>
-            <a:endParaRPr lang="ru-RU" smtClean="0"/>
           </a:p>
           <a:p>
             <a:pPr lvl="1"/>
@@ -25420,6 +25379,13 @@
   <p:clrMapOvr>
     <a:masterClrMapping/>
   </p:clrMapOvr>
+  <p:timing>
+    <p:tnLst>
+      <p:par>
+        <p:cTn id="1" dur="indefinite" restart="never" nodeType="tmRoot"/>
+      </p:par>
+    </p:tnLst>
+  </p:timing>
 </p:sld>
 </file>
 
@@ -25578,6 +25544,13 @@
   <p:clrMapOvr>
     <a:masterClrMapping/>
   </p:clrMapOvr>
+  <p:timing>
+    <p:tnLst>
+      <p:par>
+        <p:cTn id="1" dur="indefinite" restart="never" nodeType="tmRoot"/>
+      </p:par>
+    </p:tnLst>
+  </p:timing>
 </p:sld>
 </file>
 
@@ -26118,6 +26091,13 @@
   <p:clrMapOvr>
     <a:masterClrMapping/>
   </p:clrMapOvr>
+  <p:timing>
+    <p:tnLst>
+      <p:par>
+        <p:cTn id="1" dur="indefinite" restart="never" nodeType="tmRoot"/>
+      </p:par>
+    </p:tnLst>
+  </p:timing>
 </p:sld>
 </file>
 
@@ -26244,13 +26224,7 @@
               <a:rPr lang="en-US">
                 <a:latin typeface="Consolas" panose="020B0609020204030204" pitchFamily="49" charset="0"/>
               </a:rPr>
-              <a:t>template &lt;typename T, size_t N, size_t M&gt; </a:t>
-            </a:r>
-            <a:r>
-              <a:rPr lang="en-US">
-                <a:latin typeface="Consolas" panose="020B0609020204030204" pitchFamily="49" charset="0"/>
-              </a:rPr>
-              <a:t>class </a:t>
+              <a:t>template &lt;typename T, size_t N, size_t M&gt; class </a:t>
             </a:r>
             <a:r>
               <a:rPr lang="en-US" smtClean="0">
@@ -26281,13 +26255,7 @@
               <a:rPr lang="en-US">
                 <a:latin typeface="Consolas" panose="020B0609020204030204" pitchFamily="49" charset="0"/>
               </a:rPr>
-              <a:t>template &lt;typename T, size_t N, size_t M&gt; </a:t>
-            </a:r>
-            <a:r>
-              <a:rPr lang="en-US">
-                <a:latin typeface="Consolas" panose="020B0609020204030204" pitchFamily="49" charset="0"/>
-              </a:rPr>
-              <a:t>class </a:t>
+              <a:t>template &lt;typename T, size_t N, size_t M&gt; class </a:t>
             </a:r>
             <a:r>
               <a:rPr lang="en-US" smtClean="0">
@@ -26357,6 +26325,13 @@
   <p:clrMapOvr>
     <a:masterClrMapping/>
   </p:clrMapOvr>
+  <p:timing>
+    <p:tnLst>
+      <p:par>
+        <p:cTn id="1" dur="indefinite" restart="never" nodeType="tmRoot"/>
+      </p:par>
+    </p:tnLst>
+  </p:timing>
 </p:sld>
 </file>
 
@@ -26491,13 +26466,7 @@
               <a:rPr lang="en-US">
                 <a:latin typeface="Consolas" panose="020B0609020204030204" pitchFamily="49" charset="0"/>
               </a:rPr>
-              <a:t>template &lt;typename T, size_t N, size_t M&gt; </a:t>
-            </a:r>
-            <a:r>
-              <a:rPr lang="en-US">
-                <a:latin typeface="Consolas" panose="020B0609020204030204" pitchFamily="49" charset="0"/>
-              </a:rPr>
-              <a:t>class </a:t>
+              <a:t>template &lt;typename T, size_t N, size_t M&gt; class </a:t>
             </a:r>
             <a:r>
               <a:rPr lang="en-US" smtClean="0">
@@ -26528,13 +26497,7 @@
               <a:rPr lang="en-US">
                 <a:latin typeface="Consolas" panose="020B0609020204030204" pitchFamily="49" charset="0"/>
               </a:rPr>
-              <a:t>template &lt;typename T, size_t N, size_t M&gt; </a:t>
-            </a:r>
-            <a:r>
-              <a:rPr lang="en-US">
-                <a:latin typeface="Consolas" panose="020B0609020204030204" pitchFamily="49" charset="0"/>
-              </a:rPr>
-              <a:t>class </a:t>
+              <a:t>template &lt;typename T, size_t N, size_t M&gt; class </a:t>
             </a:r>
             <a:r>
               <a:rPr lang="en-US" smtClean="0">
@@ -26605,6 +26568,13 @@
   <p:clrMapOvr>
     <a:masterClrMapping/>
   </p:clrMapOvr>
+  <p:timing>
+    <p:tnLst>
+      <p:par>
+        <p:cTn id="1" dur="indefinite" restart="never" nodeType="tmRoot"/>
+      </p:par>
+    </p:tnLst>
+  </p:timing>
 </p:sld>
 </file>
 
@@ -26774,6 +26744,13 @@
   <p:clrMapOvr>
     <a:masterClrMapping/>
   </p:clrMapOvr>
+  <p:timing>
+    <p:tnLst>
+      <p:par>
+        <p:cTn id="1" dur="indefinite" restart="never" nodeType="tmRoot"/>
+      </p:par>
+    </p:tnLst>
+  </p:timing>
 </p:sld>
 </file>
 
@@ -26983,6 +26960,13 @@
   <p:clrMapOvr>
     <a:masterClrMapping/>
   </p:clrMapOvr>
+  <p:timing>
+    <p:tnLst>
+      <p:par>
+        <p:cTn id="1" dur="indefinite" restart="never" nodeType="tmRoot"/>
+      </p:par>
+    </p:tnLst>
+  </p:timing>
 </p:sld>
 </file>
 
@@ -27194,6 +27178,13 @@
   <p:clrMapOvr>
     <a:masterClrMapping/>
   </p:clrMapOvr>
+  <p:timing>
+    <p:tnLst>
+      <p:par>
+        <p:cTn id="1" dur="indefinite" restart="never" nodeType="tmRoot"/>
+      </p:par>
+    </p:tnLst>
+  </p:timing>
 </p:sld>
 </file>
 

</xml_diff>

<commit_message>
Revisiting rvalue refs part of lectures, large text rewriting
git-svn-id: https://svn.code.sf.net/p/cpp-lects-rus/code/trunk@234 39143b06-f351-456c-9f92-4cd32fad6823
</commit_message>
<xml_diff>
--- a/slides/sep2017/04-rvrefs.pptx
+++ b/slides/sep2017/04-rvrefs.pptx
@@ -271,7 +271,7 @@
           <a:p>
             <a:fld id="{42B673CC-54DE-46EA-9BF6-4F7267DE7790}" type="datetimeFigureOut">
               <a:rPr lang="en-US" smtClean="0"/>
-              <a:t>10/13/2017</a:t>
+              <a:t>11/10/2017</a:t>
             </a:fld>
             <a:endParaRPr lang="en-US"/>
           </a:p>
@@ -1071,7 +1071,7 @@
           <a:p>
             <a:fld id="{75F9419B-997A-4DB3-B455-BA5B759E50E2}" type="datetime1">
               <a:rPr lang="en-US" smtClean="0"/>
-              <a:t>10/13/2017</a:t>
+              <a:t>11/10/2017</a:t>
             </a:fld>
             <a:endParaRPr lang="en-US" dirty="0"/>
           </a:p>
@@ -1288,7 +1288,7 @@
           <a:p>
             <a:fld id="{C6CC5998-8A6A-47C5-9B68-7DBDD02CD12B}" type="datetime1">
               <a:rPr lang="en-US" smtClean="0"/>
-              <a:t>10/13/2017</a:t>
+              <a:t>11/10/2017</a:t>
             </a:fld>
             <a:endParaRPr lang="en-US" dirty="0"/>
           </a:p>
@@ -1463,7 +1463,7 @@
           <a:p>
             <a:fld id="{62E8AF54-3DCA-4889-889B-9A1B7DADA6F3}" type="datetime1">
               <a:rPr lang="en-US" smtClean="0"/>
-              <a:t>10/13/2017</a:t>
+              <a:t>11/10/2017</a:t>
             </a:fld>
             <a:endParaRPr lang="en-US" dirty="0"/>
           </a:p>
@@ -1628,7 +1628,7 @@
           <a:p>
             <a:fld id="{23B30E8C-73F3-44B6-B292-9149781C3E45}" type="datetime1">
               <a:rPr lang="en-US" smtClean="0"/>
-              <a:t>10/13/2017</a:t>
+              <a:t>11/10/2017</a:t>
             </a:fld>
             <a:endParaRPr lang="en-US" dirty="0"/>
           </a:p>
@@ -1874,7 +1874,7 @@
           <a:p>
             <a:fld id="{8F98511A-D7A1-495A-AB75-DB217D4D1BE6}" type="datetime1">
               <a:rPr lang="en-US" smtClean="0"/>
-              <a:t>10/13/2017</a:t>
+              <a:t>11/10/2017</a:t>
             </a:fld>
             <a:endParaRPr lang="en-US" dirty="0"/>
           </a:p>
@@ -2192,7 +2192,7 @@
           <a:p>
             <a:fld id="{5A3D96A9-DE7D-436E-A318-A4E69F80CDDE}" type="datetime1">
               <a:rPr lang="en-US" smtClean="0"/>
-              <a:t>10/13/2017</a:t>
+              <a:t>11/10/2017</a:t>
             </a:fld>
             <a:endParaRPr lang="en-US" dirty="0"/>
           </a:p>
@@ -2611,7 +2611,7 @@
           <a:p>
             <a:fld id="{C8C4F50B-8F30-4843-88BA-E70C6803AE81}" type="datetime1">
               <a:rPr lang="en-US" smtClean="0"/>
-              <a:t>10/13/2017</a:t>
+              <a:t>11/10/2017</a:t>
             </a:fld>
             <a:endParaRPr lang="en-US" dirty="0"/>
           </a:p>
@@ -2724,7 +2724,7 @@
           <a:p>
             <a:fld id="{D798BDAB-1A29-434F-980D-BEA612B3AFBD}" type="datetime1">
               <a:rPr lang="en-US" smtClean="0"/>
-              <a:t>10/13/2017</a:t>
+              <a:t>11/10/2017</a:t>
             </a:fld>
             <a:endParaRPr lang="en-US" dirty="0"/>
           </a:p>
@@ -2814,7 +2814,7 @@
           <a:p>
             <a:fld id="{E7C202B4-4E30-434E-A44E-E63B6767896D}" type="datetime1">
               <a:rPr lang="en-US" smtClean="0"/>
-              <a:t>10/13/2017</a:t>
+              <a:t>11/10/2017</a:t>
             </a:fld>
             <a:endParaRPr lang="en-US" dirty="0"/>
           </a:p>
@@ -3099,7 +3099,7 @@
           <a:p>
             <a:fld id="{E080761B-5701-430A-B2BB-43AA25E22D75}" type="datetime1">
               <a:rPr lang="en-US" smtClean="0"/>
-              <a:t>10/13/2017</a:t>
+              <a:t>11/10/2017</a:t>
             </a:fld>
             <a:endParaRPr lang="en-US" dirty="0"/>
           </a:p>
@@ -3366,7 +3366,7 @@
           <a:p>
             <a:fld id="{337559B5-BE9F-4B2F-BDAB-41ED7288D38B}" type="datetime1">
               <a:rPr lang="en-US" smtClean="0"/>
-              <a:t>10/13/2017</a:t>
+              <a:t>11/10/2017</a:t>
             </a:fld>
             <a:endParaRPr lang="en-US" dirty="0"/>
           </a:p>
@@ -3614,7 +3614,7 @@
           <a:p>
             <a:fld id="{9BB245C0-A2FD-4F36-99B0-F1C21E77F34C}" type="datetime1">
               <a:rPr lang="en-US" smtClean="0"/>
-              <a:t>10/13/2017</a:t>
+              <a:t>11/10/2017</a:t>
             </a:fld>
             <a:endParaRPr lang="en-US" dirty="0"/>
           </a:p>
@@ -13820,10 +13820,16 @@
               <a:t>auto </a:t>
             </a:r>
             <a:r>
-              <a:rPr lang="en-US">
-                <a:latin typeface="Consolas" panose="020B0609020204030204" pitchFamily="49" charset="0"/>
-              </a:rPr>
-              <a:t>&amp;&amp;c = y; // </a:t>
+              <a:rPr lang="en-US" smtClean="0">
+                <a:latin typeface="Consolas" panose="020B0609020204030204" pitchFamily="49" charset="0"/>
+              </a:rPr>
+              <a:t>&amp;&amp; d= move(y); </a:t>
+            </a:r>
+            <a:r>
+              <a:rPr lang="en-US">
+                <a:latin typeface="Consolas" panose="020B0609020204030204" pitchFamily="49" charset="0"/>
+              </a:rPr>
+              <a:t>// </a:t>
             </a:r>
             <a:r>
               <a:rPr lang="en-US" smtClean="0">
@@ -13989,14 +13995,28 @@
                 <a:latin typeface="Consolas" panose="020B0609020204030204" pitchFamily="49" charset="0"/>
                 <a:sym typeface="Symbol" panose="05050102010706020507" pitchFamily="18" charset="2"/>
               </a:rPr>
-              <a:t>&amp;&amp; c = y</a:t>
+              <a:t>&amp;&amp; </a:t>
             </a:r>
             <a:r>
               <a:rPr lang="en-US" smtClean="0">
                 <a:latin typeface="Consolas" panose="020B0609020204030204" pitchFamily="49" charset="0"/>
                 <a:sym typeface="Symbol" panose="05050102010706020507" pitchFamily="18" charset="2"/>
               </a:rPr>
-              <a:t>;</a:t>
+              <a:t>d </a:t>
+            </a:r>
+            <a:r>
+              <a:rPr lang="en-US">
+                <a:latin typeface="Consolas" panose="020B0609020204030204" pitchFamily="49" charset="0"/>
+                <a:sym typeface="Symbol" panose="05050102010706020507" pitchFamily="18" charset="2"/>
+              </a:rPr>
+              <a:t>= </a:t>
+            </a:r>
+            <a:r>
+              <a:rPr lang="en-US" smtClean="0">
+                <a:latin typeface="Consolas" panose="020B0609020204030204" pitchFamily="49" charset="0"/>
+                <a:sym typeface="Symbol" panose="05050102010706020507" pitchFamily="18" charset="2"/>
+              </a:rPr>
+              <a:t>move(y);</a:t>
             </a:r>
             <a:endParaRPr lang="en-US">
               <a:latin typeface="Consolas" panose="020B0609020204030204" pitchFamily="49" charset="0"/>
@@ -14265,14 +14285,34 @@
                 <a:latin typeface="Consolas" panose="020B0609020204030204" pitchFamily="49" charset="0"/>
                 <a:sym typeface="Symbol" panose="05050102010706020507" pitchFamily="18" charset="2"/>
               </a:rPr>
-              <a:t>= y</a:t>
+              <a:t>= </a:t>
             </a:r>
             <a:r>
               <a:rPr lang="en-US" smtClean="0">
                 <a:latin typeface="Consolas" panose="020B0609020204030204" pitchFamily="49" charset="0"/>
                 <a:sym typeface="Symbol" panose="05050102010706020507" pitchFamily="18" charset="2"/>
               </a:rPr>
-              <a:t>;  int &amp;&amp;d = move(y);</a:t>
+              <a:t>move(y); </a:t>
+            </a:r>
+            <a:br>
+              <a:rPr lang="en-US" smtClean="0">
+                <a:latin typeface="Consolas" panose="020B0609020204030204" pitchFamily="49" charset="0"/>
+                <a:sym typeface="Symbol" panose="05050102010706020507" pitchFamily="18" charset="2"/>
+              </a:rPr>
+            </a:br>
+            <a:r>
+              <a:rPr lang="en-US" smtClean="0">
+                <a:latin typeface="Consolas" panose="020B0609020204030204" pitchFamily="49" charset="0"/>
+                <a:sym typeface="Symbol" panose="05050102010706020507" pitchFamily="18" charset="2"/>
+              </a:rPr>
+              <a:t>                    //  </a:t>
+            </a:r>
+            <a:r>
+              <a:rPr lang="en-US" smtClean="0">
+                <a:latin typeface="Consolas" panose="020B0609020204030204" pitchFamily="49" charset="0"/>
+                <a:sym typeface="Symbol" panose="05050102010706020507" pitchFamily="18" charset="2"/>
+              </a:rPr>
+              <a:t>int &amp;&amp;d = move(y);</a:t>
             </a:r>
             <a:endParaRPr lang="en-US"/>
           </a:p>

</xml_diff>